<commit_message>
final slides from IETF91
</commit_message>
<xml_diff>
--- a/1d2d/presentations/91-mmusic-flexible-fec.pptx
+++ b/1d2d/presentations/91-mmusic-flexible-fec.pptx
@@ -5,8 +5,12 @@
     <p:sldMasterId id="2147483660" r:id="rId1"/>
   </p:sldMasterIdLst>
   <p:sldIdLst>
-    <p:sldId id="256" r:id="rId2"/>
-    <p:sldId id="257" r:id="rId3"/>
+    <p:sldId id="257" r:id="rId2"/>
+    <p:sldId id="258" r:id="rId3"/>
+    <p:sldId id="259" r:id="rId4"/>
+    <p:sldId id="268" r:id="rId5"/>
+    <p:sldId id="270" r:id="rId6"/>
+    <p:sldId id="269" r:id="rId7"/>
   </p:sldIdLst>
   <p:sldSz cx="9144000" cy="6858000" type="screen4x3"/>
   <p:notesSz cx="6858000" cy="9144000"/>
@@ -289,7 +293,7 @@
           <a:p>
             <a:fld id="{01E095AD-9D4A-054D-A7BB-31CCE71EAB80}" type="datetimeFigureOut">
               <a:rPr lang="en-US" smtClean="0"/>
-              <a:t>02/11/14</a:t>
+              <a:t>11/13/14</a:t>
             </a:fld>
             <a:endParaRPr lang="en-US"/>
           </a:p>
@@ -459,7 +463,7 @@
           <a:p>
             <a:fld id="{01E095AD-9D4A-054D-A7BB-31CCE71EAB80}" type="datetimeFigureOut">
               <a:rPr lang="en-US" smtClean="0"/>
-              <a:t>02/11/14</a:t>
+              <a:t>11/13/14</a:t>
             </a:fld>
             <a:endParaRPr lang="en-US"/>
           </a:p>
@@ -639,7 +643,7 @@
           <a:p>
             <a:fld id="{01E095AD-9D4A-054D-A7BB-31CCE71EAB80}" type="datetimeFigureOut">
               <a:rPr lang="en-US" smtClean="0"/>
-              <a:t>02/11/14</a:t>
+              <a:t>11/13/14</a:t>
             </a:fld>
             <a:endParaRPr lang="en-US"/>
           </a:p>
@@ -809,7 +813,7 @@
           <a:p>
             <a:fld id="{01E095AD-9D4A-054D-A7BB-31CCE71EAB80}" type="datetimeFigureOut">
               <a:rPr lang="en-US" smtClean="0"/>
-              <a:t>02/11/14</a:t>
+              <a:t>11/13/14</a:t>
             </a:fld>
             <a:endParaRPr lang="en-US"/>
           </a:p>
@@ -1055,7 +1059,7 @@
           <a:p>
             <a:fld id="{01E095AD-9D4A-054D-A7BB-31CCE71EAB80}" type="datetimeFigureOut">
               <a:rPr lang="en-US" smtClean="0"/>
-              <a:t>02/11/14</a:t>
+              <a:t>11/13/14</a:t>
             </a:fld>
             <a:endParaRPr lang="en-US"/>
           </a:p>
@@ -1343,7 +1347,7 @@
           <a:p>
             <a:fld id="{01E095AD-9D4A-054D-A7BB-31CCE71EAB80}" type="datetimeFigureOut">
               <a:rPr lang="en-US" smtClean="0"/>
-              <a:t>02/11/14</a:t>
+              <a:t>11/13/14</a:t>
             </a:fld>
             <a:endParaRPr lang="en-US"/>
           </a:p>
@@ -1765,7 +1769,7 @@
           <a:p>
             <a:fld id="{01E095AD-9D4A-054D-A7BB-31CCE71EAB80}" type="datetimeFigureOut">
               <a:rPr lang="en-US" smtClean="0"/>
-              <a:t>02/11/14</a:t>
+              <a:t>11/13/14</a:t>
             </a:fld>
             <a:endParaRPr lang="en-US"/>
           </a:p>
@@ -1883,7 +1887,7 @@
           <a:p>
             <a:fld id="{01E095AD-9D4A-054D-A7BB-31CCE71EAB80}" type="datetimeFigureOut">
               <a:rPr lang="en-US" smtClean="0"/>
-              <a:t>02/11/14</a:t>
+              <a:t>11/13/14</a:t>
             </a:fld>
             <a:endParaRPr lang="en-US"/>
           </a:p>
@@ -1978,7 +1982,7 @@
           <a:p>
             <a:fld id="{01E095AD-9D4A-054D-A7BB-31CCE71EAB80}" type="datetimeFigureOut">
               <a:rPr lang="en-US" smtClean="0"/>
-              <a:t>02/11/14</a:t>
+              <a:t>11/13/14</a:t>
             </a:fld>
             <a:endParaRPr lang="en-US"/>
           </a:p>
@@ -2255,7 +2259,7 @@
           <a:p>
             <a:fld id="{01E095AD-9D4A-054D-A7BB-31CCE71EAB80}" type="datetimeFigureOut">
               <a:rPr lang="en-US" smtClean="0"/>
-              <a:t>02/11/14</a:t>
+              <a:t>11/13/14</a:t>
             </a:fld>
             <a:endParaRPr lang="en-US"/>
           </a:p>
@@ -2512,7 +2516,7 @@
           <a:p>
             <a:fld id="{01E095AD-9D4A-054D-A7BB-31CCE71EAB80}" type="datetimeFigureOut">
               <a:rPr lang="en-US" smtClean="0"/>
-              <a:t>02/11/14</a:t>
+              <a:t>11/13/14</a:t>
             </a:fld>
             <a:endParaRPr lang="en-US"/>
           </a:p>
@@ -2730,7 +2734,7 @@
           <a:p>
             <a:fld id="{01E095AD-9D4A-054D-A7BB-31CCE71EAB80}" type="datetimeFigureOut">
               <a:rPr lang="en-US" smtClean="0"/>
-              <a:t>02/11/14</a:t>
+              <a:t>11/13/14</a:t>
             </a:fld>
             <a:endParaRPr lang="en-US"/>
           </a:p>
@@ -3121,12 +3125,8 @@
           <a:lstStyle/>
           <a:p>
             <a:r>
-              <a:rPr lang="en-US" dirty="0"/>
-              <a:t>f</a:t>
-            </a:r>
-            <a:r>
-              <a:rPr lang="en-US" dirty="0" smtClean="0"/>
-              <a:t>lexible-FEC</a:t>
+              <a:rPr lang="en-US" dirty="0" smtClean="0"/>
+              <a:t>FLEXFEC SDP</a:t>
             </a:r>
             <a:endParaRPr lang="en-US" dirty="0"/>
           </a:p>
@@ -3145,20 +3145,9 @@
         <p:spPr/>
         <p:txBody>
           <a:bodyPr>
-            <a:normAutofit fontScale="70000" lnSpcReduction="20000"/>
+            <a:normAutofit fontScale="55000" lnSpcReduction="20000"/>
           </a:bodyPr>
           <a:lstStyle/>
-          <a:p>
-            <a:r>
-              <a:rPr lang="en-US" dirty="0"/>
-              <a:t>Mo </a:t>
-            </a:r>
-            <a:r>
-              <a:rPr lang="en-US" dirty="0" err="1"/>
-              <a:t>Zanaty</a:t>
-            </a:r>
-            <a:endParaRPr lang="en-US" dirty="0"/>
-          </a:p>
           <a:p>
             <a:r>
               <a:rPr lang="en-US" dirty="0" smtClean="0"/>
@@ -3172,21 +3161,38 @@
           </a:p>
           <a:p>
             <a:r>
-              <a:rPr lang="en-US" dirty="0" smtClean="0"/>
+              <a:rPr lang="en-US" dirty="0"/>
               <a:t>Varun Singh</a:t>
             </a:r>
           </a:p>
           <a:p>
+            <a:r>
+              <a:rPr lang="en-US" dirty="0" smtClean="0"/>
+              <a:t>Mo </a:t>
+            </a:r>
+            <a:r>
+              <a:rPr lang="en-US" dirty="0" err="1" smtClean="0"/>
+              <a:t>Zanaty</a:t>
+            </a:r>
             <a:endParaRPr lang="en-US" dirty="0" smtClean="0"/>
           </a:p>
           <a:p>
-            <a:r>
-              <a:rPr lang="en-US" dirty="0" err="1" smtClean="0"/>
-              <a:t>AVTCore</a:t>
-            </a:r>
-            <a:r>
-              <a:rPr lang="en-US" dirty="0" smtClean="0"/>
-              <a:t>, IETF 91</a:t>
+            <a:endParaRPr lang="en-US" dirty="0" smtClean="0"/>
+          </a:p>
+          <a:p>
+            <a:r>
+              <a:rPr lang="en-US" dirty="0" smtClean="0"/>
+              <a:t>MMUSIC</a:t>
+            </a:r>
+          </a:p>
+          <a:p>
+            <a:r>
+              <a:rPr lang="en-US" dirty="0" smtClean="0"/>
+              <a:t>IETF </a:t>
+            </a:r>
+            <a:r>
+              <a:rPr lang="en-US" dirty="0" smtClean="0"/>
+              <a:t>91</a:t>
             </a:r>
           </a:p>
           <a:p>
@@ -3225,7 +3231,7 @@
     </p:spTree>
     <p:extLst>
       <p:ext uri="{BB962C8B-B14F-4D97-AF65-F5344CB8AC3E}">
-        <p14:creationId xmlns:p14="http://schemas.microsoft.com/office/powerpoint/2010/main" val="2763729964"/>
+        <p14:creationId xmlns:p14="http://schemas.microsoft.com/office/powerpoint/2010/main" val="2337919225"/>
       </p:ext>
     </p:extLst>
   </p:cSld>
@@ -3262,44 +3268,181 @@
             <p:ph type="title"/>
           </p:nvPr>
         </p:nvSpPr>
-        <p:spPr/>
-        <p:txBody>
-          <a:bodyPr/>
-          <a:lstStyle/>
-          <a:p>
-            <a:r>
-              <a:rPr lang="en-US" dirty="0" smtClean="0"/>
+        <p:spPr>
+          <a:xfrm>
+            <a:off x="457200" y="274638"/>
+            <a:ext cx="8229600" cy="921274"/>
+          </a:xfrm>
+        </p:spPr>
+        <p:txBody>
+          <a:bodyPr>
+            <a:normAutofit/>
+          </a:bodyPr>
+          <a:lstStyle/>
+          <a:p>
+            <a:r>
+              <a:rPr lang="en-US" sz="3200" dirty="0" smtClean="0"/>
               <a:t>Motivation</a:t>
             </a:r>
+            <a:endParaRPr lang="en-US" sz="3200" dirty="0"/>
+          </a:p>
+        </p:txBody>
+      </p:sp>
+      <p:sp>
+        <p:nvSpPr>
+          <p:cNvPr id="3" name="Content Placeholder 2"/>
+          <p:cNvSpPr>
+            <a:spLocks noGrp="1"/>
+          </p:cNvSpPr>
+          <p:nvPr>
+            <p:ph idx="1"/>
+          </p:nvPr>
+        </p:nvSpPr>
+        <p:spPr>
+          <a:xfrm>
+            <a:off x="457200" y="1195912"/>
+            <a:ext cx="8229600" cy="5128859"/>
+          </a:xfrm>
+        </p:spPr>
+        <p:txBody>
+          <a:bodyPr>
+            <a:normAutofit fontScale="77500" lnSpcReduction="20000"/>
+          </a:bodyPr>
+          <a:lstStyle/>
+          <a:p>
+            <a:r>
+              <a:rPr lang="en-US" dirty="0" smtClean="0"/>
+              <a:t>Current FEC standards lack sufficient flexibility to be usable for many use cases, including RTCWEB</a:t>
+            </a:r>
+          </a:p>
+          <a:p>
+            <a:endParaRPr lang="en-US" dirty="0" smtClean="0"/>
+          </a:p>
+          <a:p>
+            <a:r>
+              <a:rPr lang="en-US" dirty="0"/>
+              <a:t>RFC 2733 XOR with 24-bit </a:t>
+            </a:r>
+            <a:r>
+              <a:rPr lang="en-US" dirty="0" smtClean="0"/>
+              <a:t>mask: </a:t>
+            </a:r>
+            <a:r>
+              <a:rPr lang="en-US" dirty="0"/>
+              <a:t>obsoleted by </a:t>
+            </a:r>
+            <a:r>
+              <a:rPr lang="en-US" dirty="0" smtClean="0"/>
+              <a:t>5109</a:t>
+            </a:r>
+          </a:p>
+          <a:p>
+            <a:r>
+              <a:rPr lang="en-US" dirty="0" smtClean="0"/>
+              <a:t>RFC 5109 XOR with 48-bit mask and ULP:</a:t>
+            </a:r>
+          </a:p>
+          <a:p>
+            <a:pPr lvl="1"/>
+            <a:r>
+              <a:rPr lang="en-US" dirty="0" smtClean="0"/>
+              <a:t>SSRC multiplexing not supported</a:t>
+            </a:r>
+          </a:p>
+          <a:p>
+            <a:pPr lvl="2"/>
+            <a:r>
+              <a:rPr lang="en-US" dirty="0" smtClean="0"/>
+              <a:t>draft</a:t>
+            </a:r>
+            <a:r>
+              <a:rPr lang="en-US" dirty="0"/>
+              <a:t>-</a:t>
+            </a:r>
+            <a:r>
+              <a:rPr lang="en-US" dirty="0" err="1"/>
+              <a:t>lennox</a:t>
+            </a:r>
+            <a:r>
+              <a:rPr lang="en-US" dirty="0"/>
+              <a:t>-payload-</a:t>
+            </a:r>
+            <a:r>
+              <a:rPr lang="en-US" dirty="0" err="1"/>
+              <a:t>ulp</a:t>
+            </a:r>
+            <a:r>
+              <a:rPr lang="en-US" dirty="0"/>
+              <a:t>-</a:t>
+            </a:r>
+            <a:r>
+              <a:rPr lang="en-US" dirty="0" err="1"/>
+              <a:t>ssrc</a:t>
+            </a:r>
+            <a:r>
+              <a:rPr lang="en-US" dirty="0"/>
+              <a:t>-</a:t>
+            </a:r>
+            <a:r>
+              <a:rPr lang="en-US" dirty="0" smtClean="0"/>
+              <a:t>mux proposes a=</a:t>
+            </a:r>
+            <a:r>
+              <a:rPr lang="en-US" dirty="0" err="1" smtClean="0"/>
+              <a:t>ssrc-group:FEC</a:t>
+            </a:r>
+            <a:r>
+              <a:rPr lang="en-US" dirty="0" smtClean="0"/>
+              <a:t> </a:t>
+            </a:r>
+          </a:p>
+          <a:p>
+            <a:pPr lvl="1"/>
+            <a:r>
+              <a:rPr lang="en-US" dirty="0" smtClean="0"/>
+              <a:t>48-bit mask insufficient for interleaved FEC to recover from burst loss, and requires &gt;2% FEC</a:t>
+            </a:r>
+          </a:p>
+          <a:p>
+            <a:r>
+              <a:rPr lang="en-US" dirty="0" smtClean="0"/>
+              <a:t>RFC 6015 XOR with fixed 1D interleaved FEC:</a:t>
+            </a:r>
+          </a:p>
+          <a:p>
+            <a:pPr lvl="1"/>
+            <a:r>
+              <a:rPr lang="en-US" dirty="0" smtClean="0"/>
+              <a:t>Non-standard RTP header prevents general use</a:t>
+            </a:r>
+          </a:p>
+          <a:p>
+            <a:pPr lvl="1"/>
+            <a:r>
+              <a:rPr lang="en-US" dirty="0" smtClean="0"/>
+              <a:t>Fixed parameters not suited for adaptive real-time cases</a:t>
+            </a:r>
+          </a:p>
+          <a:p>
+            <a:r>
+              <a:rPr lang="en-US" dirty="0"/>
+              <a:t>RFC 6682 Raptor FEC: IPR declarations </a:t>
+            </a:r>
+            <a:r>
+              <a:rPr lang="en-US" dirty="0" smtClean="0"/>
+              <a:t>exist</a:t>
+            </a:r>
             <a:endParaRPr lang="en-US" dirty="0"/>
           </a:p>
-        </p:txBody>
-      </p:sp>
-      <p:sp>
-        <p:nvSpPr>
-          <p:cNvPr id="3" name="Content Placeholder 2"/>
-          <p:cNvSpPr>
-            <a:spLocks noGrp="1"/>
-          </p:cNvSpPr>
-          <p:nvPr>
-            <p:ph idx="1"/>
-          </p:nvPr>
-        </p:nvSpPr>
-        <p:spPr/>
-        <p:txBody>
-          <a:bodyPr/>
-          <a:lstStyle/>
-          <a:p>
-            <a:r>
-              <a:rPr lang="en-US" smtClean="0"/>
-              <a:t>Bundle </a:t>
-            </a:r>
-            <a:endParaRPr lang="en-US" dirty="0" smtClean="0"/>
-          </a:p>
-          <a:p>
-            <a:endParaRPr lang="en-US" dirty="0"/>
-          </a:p>
-          <a:p>
+          <a:p>
+            <a:r>
+              <a:rPr lang="en-US" dirty="0"/>
+              <a:t>RFC 6865 Reed-Solomon FEC: no RTP </a:t>
+            </a:r>
+            <a:r>
+              <a:rPr lang="en-US" dirty="0" smtClean="0"/>
+              <a:t>format</a:t>
+            </a:r>
             <a:endParaRPr lang="en-US" dirty="0"/>
           </a:p>
         </p:txBody>
@@ -3307,7 +3450,662 @@
     </p:spTree>
     <p:extLst>
       <p:ext uri="{BB962C8B-B14F-4D97-AF65-F5344CB8AC3E}">
-        <p14:creationId xmlns:p14="http://schemas.microsoft.com/office/powerpoint/2010/main" val="2468345037"/>
+        <p14:creationId xmlns:p14="http://schemas.microsoft.com/office/powerpoint/2010/main" val="3125394821"/>
+      </p:ext>
+    </p:extLst>
+  </p:cSld>
+  <p:clrMapOvr>
+    <a:masterClrMapping/>
+  </p:clrMapOvr>
+</p:sld>
+</file>
+
+<file path=ppt/slides/slide3.xml><?xml version="1.0" encoding="utf-8"?>
+<p:sld xmlns:a="http://schemas.openxmlformats.org/drawingml/2006/main" xmlns:r="http://schemas.openxmlformats.org/officeDocument/2006/relationships" xmlns:p="http://schemas.openxmlformats.org/presentationml/2006/main">
+  <p:cSld>
+    <p:spTree>
+      <p:nvGrpSpPr>
+        <p:cNvPr id="1" name=""/>
+        <p:cNvGrpSpPr/>
+        <p:nvPr/>
+      </p:nvGrpSpPr>
+      <p:grpSpPr>
+        <a:xfrm>
+          <a:off x="0" y="0"/>
+          <a:ext cx="0" cy="0"/>
+          <a:chOff x="0" y="0"/>
+          <a:chExt cx="0" cy="0"/>
+        </a:xfrm>
+      </p:grpSpPr>
+      <p:sp>
+        <p:nvSpPr>
+          <p:cNvPr id="2" name="Title 1"/>
+          <p:cNvSpPr>
+            <a:spLocks noGrp="1"/>
+          </p:cNvSpPr>
+          <p:nvPr>
+            <p:ph type="title"/>
+          </p:nvPr>
+        </p:nvSpPr>
+        <p:spPr>
+          <a:xfrm>
+            <a:off x="457200" y="274638"/>
+            <a:ext cx="8229600" cy="921274"/>
+          </a:xfrm>
+        </p:spPr>
+        <p:txBody>
+          <a:bodyPr>
+            <a:normAutofit/>
+          </a:bodyPr>
+          <a:lstStyle/>
+          <a:p>
+            <a:r>
+              <a:rPr lang="en-US" sz="3200" dirty="0" smtClean="0"/>
+              <a:t>Proposed Solution</a:t>
+            </a:r>
+            <a:endParaRPr lang="en-US" sz="3200" dirty="0"/>
+          </a:p>
+        </p:txBody>
+      </p:sp>
+      <p:sp>
+        <p:nvSpPr>
+          <p:cNvPr id="3" name="Content Placeholder 2"/>
+          <p:cNvSpPr>
+            <a:spLocks noGrp="1"/>
+          </p:cNvSpPr>
+          <p:nvPr>
+            <p:ph idx="1"/>
+          </p:nvPr>
+        </p:nvSpPr>
+        <p:spPr>
+          <a:xfrm>
+            <a:off x="457200" y="1195912"/>
+            <a:ext cx="8229600" cy="5128859"/>
+          </a:xfrm>
+        </p:spPr>
+        <p:txBody>
+          <a:bodyPr>
+            <a:normAutofit fontScale="62500" lnSpcReduction="20000"/>
+          </a:bodyPr>
+          <a:lstStyle/>
+          <a:p>
+            <a:r>
+              <a:rPr lang="en-US" dirty="0" smtClean="0"/>
+              <a:t>New flexible FEC payload format </a:t>
+            </a:r>
+            <a:r>
+              <a:rPr lang="en-US" dirty="0" smtClean="0"/>
+              <a:t>‘</a:t>
+            </a:r>
+            <a:r>
+              <a:rPr lang="en-US" dirty="0" smtClean="0"/>
+              <a:t>FLEXFEC</a:t>
+            </a:r>
+            <a:r>
+              <a:rPr lang="en-US" dirty="0" smtClean="0"/>
+              <a:t>’</a:t>
+            </a:r>
+            <a:endParaRPr lang="en-US" dirty="0" smtClean="0"/>
+          </a:p>
+          <a:p>
+            <a:endParaRPr lang="en-US" dirty="0" smtClean="0"/>
+          </a:p>
+          <a:p>
+            <a:r>
+              <a:rPr lang="en-US" b="1" dirty="0" smtClean="0"/>
+              <a:t>Flexibility </a:t>
+            </a:r>
+            <a:r>
+              <a:rPr lang="en-US" b="1" dirty="0" smtClean="0"/>
+              <a:t>to use different multiplexing:</a:t>
+            </a:r>
+          </a:p>
+          <a:p>
+            <a:pPr lvl="1"/>
+            <a:r>
+              <a:rPr lang="en-US" dirty="0" smtClean="0"/>
+              <a:t>SSRC multiplexing (e.g. BUNDLE, Unified Plan)</a:t>
+            </a:r>
+          </a:p>
+          <a:p>
+            <a:pPr lvl="1"/>
+            <a:r>
+              <a:rPr lang="en-US" dirty="0" smtClean="0"/>
+              <a:t>RTP session multiplexing (e.g. multicast, legacy SIP)</a:t>
+            </a:r>
+          </a:p>
+          <a:p>
+            <a:pPr lvl="1"/>
+            <a:r>
+              <a:rPr lang="en-US" dirty="0" smtClean="0"/>
+              <a:t>PT multiplexing within the same RTP stream</a:t>
+            </a:r>
+          </a:p>
+          <a:p>
+            <a:pPr lvl="1"/>
+            <a:r>
+              <a:rPr lang="en-US" dirty="0" smtClean="0"/>
+              <a:t>RED multiplexing within the same RTP </a:t>
+            </a:r>
+            <a:r>
+              <a:rPr lang="en-US" dirty="0" smtClean="0"/>
+              <a:t>packet</a:t>
+            </a:r>
+          </a:p>
+          <a:p>
+            <a:pPr lvl="1"/>
+            <a:endParaRPr lang="en-US" dirty="0" smtClean="0"/>
+          </a:p>
+          <a:p>
+            <a:r>
+              <a:rPr lang="en-US" dirty="0"/>
+              <a:t>Flexibility for sender to adapt FEC scheme based on dynamic network conditions (e.g. RTCP</a:t>
+            </a:r>
+            <a:r>
+              <a:rPr lang="en-US" dirty="0" smtClean="0"/>
+              <a:t>)</a:t>
+            </a:r>
+          </a:p>
+          <a:p>
+            <a:endParaRPr lang="en-US" dirty="0"/>
+          </a:p>
+          <a:p>
+            <a:r>
+              <a:rPr lang="en-US" dirty="0" smtClean="0"/>
+              <a:t>16</a:t>
+            </a:r>
+            <a:r>
+              <a:rPr lang="en-US" dirty="0" smtClean="0"/>
+              <a:t>, 48 or 112-bit mask for irregular FEC patterns</a:t>
+            </a:r>
+          </a:p>
+          <a:p>
+            <a:pPr lvl="1"/>
+            <a:r>
+              <a:rPr lang="en-US" dirty="0" smtClean="0"/>
+              <a:t>112-bit mask allows larger source blocks and &lt;1% </a:t>
+            </a:r>
+            <a:r>
+              <a:rPr lang="en-US" dirty="0" smtClean="0"/>
+              <a:t>FEC</a:t>
+            </a:r>
+          </a:p>
+          <a:p>
+            <a:pPr lvl="1"/>
+            <a:endParaRPr lang="en-US" dirty="0" smtClean="0"/>
+          </a:p>
+          <a:p>
+            <a:r>
+              <a:rPr lang="en-US" dirty="0" smtClean="0"/>
+              <a:t>Virtual bit mask for larger, regular FEC patterns up to:</a:t>
+            </a:r>
+          </a:p>
+          <a:p>
+            <a:pPr lvl="1"/>
+            <a:r>
+              <a:rPr lang="en-US" dirty="0" smtClean="0"/>
+              <a:t>255 non-interleaved (1D row) source packets, or</a:t>
+            </a:r>
+          </a:p>
+          <a:p>
+            <a:pPr lvl="1"/>
+            <a:r>
+              <a:rPr lang="en-US" dirty="0" smtClean="0"/>
+              <a:t>255x255 interleaved (2D column*row) source packets</a:t>
+            </a:r>
+          </a:p>
+        </p:txBody>
+      </p:sp>
+    </p:spTree>
+    <p:extLst>
+      <p:ext uri="{BB962C8B-B14F-4D97-AF65-F5344CB8AC3E}">
+        <p14:creationId xmlns:p14="http://schemas.microsoft.com/office/powerpoint/2010/main" val="3455614091"/>
+      </p:ext>
+    </p:extLst>
+  </p:cSld>
+  <p:clrMapOvr>
+    <a:masterClrMapping/>
+  </p:clrMapOvr>
+</p:sld>
+</file>
+
+<file path=ppt/slides/slide4.xml><?xml version="1.0" encoding="utf-8"?>
+<p:sld xmlns:a="http://schemas.openxmlformats.org/drawingml/2006/main" xmlns:r="http://schemas.openxmlformats.org/officeDocument/2006/relationships" xmlns:p="http://schemas.openxmlformats.org/presentationml/2006/main">
+  <p:cSld>
+    <p:spTree>
+      <p:nvGrpSpPr>
+        <p:cNvPr id="1" name=""/>
+        <p:cNvGrpSpPr/>
+        <p:nvPr/>
+      </p:nvGrpSpPr>
+      <p:grpSpPr>
+        <a:xfrm>
+          <a:off x="0" y="0"/>
+          <a:ext cx="0" cy="0"/>
+          <a:chOff x="0" y="0"/>
+          <a:chExt cx="0" cy="0"/>
+        </a:xfrm>
+      </p:grpSpPr>
+      <p:sp>
+        <p:nvSpPr>
+          <p:cNvPr id="2" name="Title 1"/>
+          <p:cNvSpPr>
+            <a:spLocks noGrp="1"/>
+          </p:cNvSpPr>
+          <p:nvPr>
+            <p:ph type="title"/>
+          </p:nvPr>
+        </p:nvSpPr>
+        <p:spPr/>
+        <p:txBody>
+          <a:bodyPr/>
+          <a:lstStyle/>
+          <a:p>
+            <a:r>
+              <a:rPr lang="en-US" dirty="0" smtClean="0"/>
+              <a:t>SDP using PT association</a:t>
+            </a:r>
+            <a:endParaRPr lang="en-US" dirty="0"/>
+          </a:p>
+        </p:txBody>
+      </p:sp>
+      <p:sp>
+        <p:nvSpPr>
+          <p:cNvPr id="3" name="Content Placeholder 2"/>
+          <p:cNvSpPr>
+            <a:spLocks noGrp="1"/>
+          </p:cNvSpPr>
+          <p:nvPr>
+            <p:ph idx="1"/>
+          </p:nvPr>
+        </p:nvSpPr>
+        <p:spPr/>
+        <p:txBody>
+          <a:bodyPr>
+            <a:normAutofit fontScale="77500" lnSpcReduction="20000"/>
+          </a:bodyPr>
+          <a:lstStyle/>
+          <a:p>
+            <a:pPr marL="0" indent="0">
+              <a:buNone/>
+            </a:pPr>
+            <a:r>
+              <a:rPr lang="en-US" dirty="0" smtClean="0"/>
+              <a:t>a=rtpmap:96 VP8/90000</a:t>
+            </a:r>
+          </a:p>
+          <a:p>
+            <a:pPr marL="0" indent="0">
+              <a:buNone/>
+            </a:pPr>
+            <a:r>
+              <a:rPr lang="en-US" dirty="0"/>
+              <a:t>a=rtpmap:</a:t>
+            </a:r>
+            <a:r>
+              <a:rPr lang="en-US" dirty="0" smtClean="0"/>
+              <a:t>97 H264/</a:t>
+            </a:r>
+            <a:r>
+              <a:rPr lang="en-US" dirty="0"/>
+              <a:t>90000</a:t>
+            </a:r>
+          </a:p>
+          <a:p>
+            <a:pPr marL="0" indent="0">
+              <a:buNone/>
+            </a:pPr>
+            <a:r>
+              <a:rPr lang="en-US" dirty="0" smtClean="0"/>
+              <a:t>a=rtpmap:98 FLEXFEC/90000</a:t>
+            </a:r>
+          </a:p>
+          <a:p>
+            <a:pPr marL="0" indent="0">
+              <a:buNone/>
+            </a:pPr>
+            <a:r>
+              <a:rPr lang="en-US" dirty="0" smtClean="0"/>
+              <a:t>a=fmtp:98 apt=96,97; code=</a:t>
+            </a:r>
+            <a:r>
+              <a:rPr lang="en-US" dirty="0" err="1" smtClean="0"/>
+              <a:t>xor</a:t>
+            </a:r>
+            <a:r>
+              <a:rPr lang="en-US" dirty="0" smtClean="0"/>
+              <a:t>; repair-window=200ms</a:t>
+            </a:r>
+          </a:p>
+          <a:p>
+            <a:pPr marL="0" indent="0">
+              <a:buNone/>
+            </a:pPr>
+            <a:endParaRPr lang="en-US" dirty="0" smtClean="0"/>
+          </a:p>
+          <a:p>
+            <a:r>
+              <a:rPr lang="en-US" dirty="0"/>
+              <a:t>a</a:t>
+            </a:r>
+            <a:r>
+              <a:rPr lang="en-US" dirty="0" smtClean="0"/>
+              <a:t>pt associates the Redundant Stream packets with the source Encoded Stream packets. (Similar to RTX)</a:t>
+            </a:r>
+          </a:p>
+          <a:p>
+            <a:r>
+              <a:rPr lang="en-US" dirty="0"/>
+              <a:t>r</a:t>
+            </a:r>
+            <a:r>
+              <a:rPr lang="en-US" dirty="0" smtClean="0"/>
+              <a:t>epair-window specifies how long the receiver can wait for repair packets, in units of </a:t>
+            </a:r>
+            <a:r>
+              <a:rPr lang="en-US" dirty="0" err="1" smtClean="0"/>
+              <a:t>ms</a:t>
+            </a:r>
+            <a:r>
+              <a:rPr lang="en-US" dirty="0" smtClean="0"/>
+              <a:t> or us.</a:t>
+            </a:r>
+          </a:p>
+          <a:p>
+            <a:r>
+              <a:rPr lang="en-US" dirty="0" smtClean="0"/>
+              <a:t>code is an optional parameter for future extensibility to more FEC codes.</a:t>
+            </a:r>
+          </a:p>
+          <a:p>
+            <a:pPr lvl="1"/>
+            <a:r>
+              <a:rPr lang="en-US" dirty="0" smtClean="0"/>
+              <a:t>default is </a:t>
+            </a:r>
+            <a:r>
+              <a:rPr lang="en-US" dirty="0" err="1" smtClean="0"/>
+              <a:t>xor</a:t>
+            </a:r>
+            <a:r>
+              <a:rPr lang="en-US" dirty="0" smtClean="0"/>
+              <a:t> if omitted</a:t>
+            </a:r>
+            <a:endParaRPr lang="en-US" dirty="0"/>
+          </a:p>
+        </p:txBody>
+      </p:sp>
+    </p:spTree>
+    <p:extLst>
+      <p:ext uri="{BB962C8B-B14F-4D97-AF65-F5344CB8AC3E}">
+        <p14:creationId xmlns:p14="http://schemas.microsoft.com/office/powerpoint/2010/main" val="2869062245"/>
+      </p:ext>
+    </p:extLst>
+  </p:cSld>
+  <p:clrMapOvr>
+    <a:masterClrMapping/>
+  </p:clrMapOvr>
+</p:sld>
+</file>
+
+<file path=ppt/slides/slide5.xml><?xml version="1.0" encoding="utf-8"?>
+<p:sld xmlns:a="http://schemas.openxmlformats.org/drawingml/2006/main" xmlns:r="http://schemas.openxmlformats.org/officeDocument/2006/relationships" xmlns:p="http://schemas.openxmlformats.org/presentationml/2006/main">
+  <p:cSld>
+    <p:spTree>
+      <p:nvGrpSpPr>
+        <p:cNvPr id="1" name=""/>
+        <p:cNvGrpSpPr/>
+        <p:nvPr/>
+      </p:nvGrpSpPr>
+      <p:grpSpPr>
+        <a:xfrm>
+          <a:off x="0" y="0"/>
+          <a:ext cx="0" cy="0"/>
+          <a:chOff x="0" y="0"/>
+          <a:chExt cx="0" cy="0"/>
+        </a:xfrm>
+      </p:grpSpPr>
+      <p:sp>
+        <p:nvSpPr>
+          <p:cNvPr id="2" name="Title 1"/>
+          <p:cNvSpPr>
+            <a:spLocks noGrp="1"/>
+          </p:cNvSpPr>
+          <p:nvPr>
+            <p:ph type="title"/>
+          </p:nvPr>
+        </p:nvSpPr>
+        <p:spPr/>
+        <p:txBody>
+          <a:bodyPr/>
+          <a:lstStyle/>
+          <a:p>
+            <a:r>
+              <a:rPr lang="en-US" dirty="0" smtClean="0"/>
+              <a:t>SDP using SSRC association</a:t>
+            </a:r>
+            <a:endParaRPr lang="en-US" dirty="0"/>
+          </a:p>
+        </p:txBody>
+      </p:sp>
+      <p:sp>
+        <p:nvSpPr>
+          <p:cNvPr id="3" name="Content Placeholder 2"/>
+          <p:cNvSpPr>
+            <a:spLocks noGrp="1"/>
+          </p:cNvSpPr>
+          <p:nvPr>
+            <p:ph idx="1"/>
+          </p:nvPr>
+        </p:nvSpPr>
+        <p:spPr/>
+        <p:txBody>
+          <a:bodyPr>
+            <a:normAutofit fontScale="85000" lnSpcReduction="20000"/>
+          </a:bodyPr>
+          <a:lstStyle/>
+          <a:p>
+            <a:pPr marL="0" indent="0">
+              <a:buNone/>
+            </a:pPr>
+            <a:r>
+              <a:rPr lang="en-US" dirty="0" smtClean="0"/>
+              <a:t>a=rtpmap:96 VP8/90000</a:t>
+            </a:r>
+          </a:p>
+          <a:p>
+            <a:pPr marL="0" indent="0">
+              <a:buNone/>
+            </a:pPr>
+            <a:r>
+              <a:rPr lang="en-US" dirty="0"/>
+              <a:t>a=rtpmap:</a:t>
+            </a:r>
+            <a:r>
+              <a:rPr lang="en-US" dirty="0" smtClean="0"/>
+              <a:t>97 H264/</a:t>
+            </a:r>
+            <a:r>
+              <a:rPr lang="en-US" dirty="0"/>
+              <a:t>90000</a:t>
+            </a:r>
+          </a:p>
+          <a:p>
+            <a:pPr marL="0" indent="0">
+              <a:buNone/>
+            </a:pPr>
+            <a:r>
+              <a:rPr lang="en-US" dirty="0" smtClean="0"/>
+              <a:t>a=rtpmap:98 FLEXFEC/90000</a:t>
+            </a:r>
+          </a:p>
+          <a:p>
+            <a:pPr marL="0" indent="0">
+              <a:buNone/>
+            </a:pPr>
+            <a:r>
+              <a:rPr lang="en-US" dirty="0" smtClean="0"/>
+              <a:t>a=fmtp:98 code=</a:t>
+            </a:r>
+            <a:r>
+              <a:rPr lang="en-US" dirty="0" err="1" smtClean="0"/>
+              <a:t>xor</a:t>
+            </a:r>
+            <a:r>
+              <a:rPr lang="en-US" dirty="0" smtClean="0"/>
+              <a:t>; repair-window=200ms</a:t>
+            </a:r>
+          </a:p>
+          <a:p>
+            <a:pPr marL="0" indent="0">
+              <a:buNone/>
+            </a:pPr>
+            <a:r>
+              <a:rPr lang="en-US" dirty="0" smtClean="0"/>
+              <a:t>a=ssrc:1234</a:t>
+            </a:r>
+          </a:p>
+          <a:p>
+            <a:pPr marL="0" indent="0">
+              <a:buNone/>
+            </a:pPr>
+            <a:r>
+              <a:rPr lang="en-US" dirty="0"/>
+              <a:t>a=ssrc</a:t>
+            </a:r>
+            <a:r>
+              <a:rPr lang="en-US" dirty="0" smtClean="0"/>
+              <a:t>:5678</a:t>
+            </a:r>
+          </a:p>
+          <a:p>
+            <a:pPr marL="0" indent="0">
+              <a:buNone/>
+            </a:pPr>
+            <a:r>
+              <a:rPr lang="en-US" dirty="0" smtClean="0"/>
+              <a:t>a=</a:t>
+            </a:r>
+            <a:r>
+              <a:rPr lang="en-US" dirty="0" err="1" smtClean="0"/>
+              <a:t>ssrc-group:FEC-FR</a:t>
+            </a:r>
+            <a:r>
+              <a:rPr lang="en-US" dirty="0" smtClean="0"/>
+              <a:t> 1234 5678</a:t>
+            </a:r>
+          </a:p>
+          <a:p>
+            <a:pPr marL="0" indent="0">
+              <a:buNone/>
+            </a:pPr>
+            <a:endParaRPr lang="en-US" dirty="0" smtClean="0"/>
+          </a:p>
+          <a:p>
+            <a:r>
+              <a:rPr lang="en-US" b="1" dirty="0" err="1" smtClean="0"/>
+              <a:t>ssrc</a:t>
+            </a:r>
+            <a:r>
+              <a:rPr lang="en-US" b="1" dirty="0" smtClean="0"/>
+              <a:t>-group</a:t>
+            </a:r>
+            <a:r>
+              <a:rPr lang="en-US" dirty="0" smtClean="0"/>
+              <a:t> associates the Redundant Stream (SSRC 5678) with the source Encoded Stream (SSRC 1234).</a:t>
+            </a:r>
+          </a:p>
+        </p:txBody>
+      </p:sp>
+    </p:spTree>
+    <p:extLst>
+      <p:ext uri="{BB962C8B-B14F-4D97-AF65-F5344CB8AC3E}">
+        <p14:creationId xmlns:p14="http://schemas.microsoft.com/office/powerpoint/2010/main" val="3498950747"/>
+      </p:ext>
+    </p:extLst>
+  </p:cSld>
+  <p:clrMapOvr>
+    <a:masterClrMapping/>
+  </p:clrMapOvr>
+</p:sld>
+</file>
+
+<file path=ppt/slides/slide6.xml><?xml version="1.0" encoding="utf-8"?>
+<p:sld xmlns:a="http://schemas.openxmlformats.org/drawingml/2006/main" xmlns:r="http://schemas.openxmlformats.org/officeDocument/2006/relationships" xmlns:p="http://schemas.openxmlformats.org/presentationml/2006/main">
+  <p:cSld>
+    <p:spTree>
+      <p:nvGrpSpPr>
+        <p:cNvPr id="1" name=""/>
+        <p:cNvGrpSpPr/>
+        <p:nvPr/>
+      </p:nvGrpSpPr>
+      <p:grpSpPr>
+        <a:xfrm>
+          <a:off x="0" y="0"/>
+          <a:ext cx="0" cy="0"/>
+          <a:chOff x="0" y="0"/>
+          <a:chExt cx="0" cy="0"/>
+        </a:xfrm>
+      </p:grpSpPr>
+      <p:sp>
+        <p:nvSpPr>
+          <p:cNvPr id="2" name="Title 1"/>
+          <p:cNvSpPr>
+            <a:spLocks noGrp="1"/>
+          </p:cNvSpPr>
+          <p:nvPr>
+            <p:ph type="title"/>
+          </p:nvPr>
+        </p:nvSpPr>
+        <p:spPr/>
+        <p:txBody>
+          <a:bodyPr/>
+          <a:lstStyle/>
+          <a:p>
+            <a:r>
+              <a:rPr lang="en-US" dirty="0" smtClean="0"/>
+              <a:t>Next steps</a:t>
+            </a:r>
+            <a:endParaRPr lang="en-US" dirty="0"/>
+          </a:p>
+        </p:txBody>
+      </p:sp>
+      <p:sp>
+        <p:nvSpPr>
+          <p:cNvPr id="3" name="Content Placeholder 2"/>
+          <p:cNvSpPr>
+            <a:spLocks noGrp="1"/>
+          </p:cNvSpPr>
+          <p:nvPr>
+            <p:ph idx="1"/>
+          </p:nvPr>
+        </p:nvSpPr>
+        <p:spPr/>
+        <p:txBody>
+          <a:bodyPr/>
+          <a:lstStyle/>
+          <a:p>
+            <a:r>
+              <a:rPr lang="en-US" dirty="0" smtClean="0"/>
+              <a:t>Agree in MMUSIC on multiplexing and binding source and repair streams in SDP</a:t>
+            </a:r>
+          </a:p>
+          <a:p>
+            <a:endParaRPr lang="en-US" dirty="0" smtClean="0"/>
+          </a:p>
+          <a:p>
+            <a:r>
+              <a:rPr lang="en-US" dirty="0" smtClean="0"/>
+              <a:t>Adoption as PAYLOAD WG-item</a:t>
+            </a:r>
+            <a:endParaRPr lang="en-US" dirty="0"/>
+          </a:p>
+        </p:txBody>
+      </p:sp>
+    </p:spTree>
+    <p:extLst>
+      <p:ext uri="{BB962C8B-B14F-4D97-AF65-F5344CB8AC3E}">
+        <p14:creationId xmlns:p14="http://schemas.microsoft.com/office/powerpoint/2010/main" val="1479995753"/>
       </p:ext>
     </p:extLst>
   </p:cSld>

</xml_diff>